<commit_message>
fix c2/b box highlighting bug
</commit_message>
<xml_diff>
--- a/instructor/l14/l14-pad.pptx
+++ b/instructor/l14/l14-pad.pptx
@@ -205,7 +205,7 @@
           <a:p>
             <a:fld id="{D79E93A9-A8A7-F248-9CE1-92E13249F48C}" type="datetimeFigureOut">
               <a:rPr lang="en-US" smtClean="0"/>
-              <a:t>10/30/23</a:t>
+              <a:t>10/31/23</a:t>
             </a:fld>
             <a:endParaRPr lang="en-US"/>
           </a:p>
@@ -703,7 +703,7 @@
           <a:p>
             <a:fld id="{786A929C-FE04-1346-8C31-1E928BF786A4}" type="datetimeFigureOut">
               <a:rPr lang="en-US" smtClean="0"/>
-              <a:t>10/30/23</a:t>
+              <a:t>10/31/23</a:t>
             </a:fld>
             <a:endParaRPr lang="en-US"/>
           </a:p>
@@ -901,7 +901,7 @@
           <a:p>
             <a:fld id="{786A929C-FE04-1346-8C31-1E928BF786A4}" type="datetimeFigureOut">
               <a:rPr lang="en-US" smtClean="0"/>
-              <a:t>10/30/23</a:t>
+              <a:t>10/31/23</a:t>
             </a:fld>
             <a:endParaRPr lang="en-US"/>
           </a:p>
@@ -1109,7 +1109,7 @@
           <a:p>
             <a:fld id="{786A929C-FE04-1346-8C31-1E928BF786A4}" type="datetimeFigureOut">
               <a:rPr lang="en-US" smtClean="0"/>
-              <a:t>10/30/23</a:t>
+              <a:t>10/31/23</a:t>
             </a:fld>
             <a:endParaRPr lang="en-US"/>
           </a:p>
@@ -1307,7 +1307,7 @@
           <a:p>
             <a:fld id="{786A929C-FE04-1346-8C31-1E928BF786A4}" type="datetimeFigureOut">
               <a:rPr lang="en-US" smtClean="0"/>
-              <a:t>10/30/23</a:t>
+              <a:t>10/31/23</a:t>
             </a:fld>
             <a:endParaRPr lang="en-US"/>
           </a:p>
@@ -1582,7 +1582,7 @@
           <a:p>
             <a:fld id="{786A929C-FE04-1346-8C31-1E928BF786A4}" type="datetimeFigureOut">
               <a:rPr lang="en-US" smtClean="0"/>
-              <a:t>10/30/23</a:t>
+              <a:t>10/31/23</a:t>
             </a:fld>
             <a:endParaRPr lang="en-US"/>
           </a:p>
@@ -1847,7 +1847,7 @@
           <a:p>
             <a:fld id="{786A929C-FE04-1346-8C31-1E928BF786A4}" type="datetimeFigureOut">
               <a:rPr lang="en-US" smtClean="0"/>
-              <a:t>10/30/23</a:t>
+              <a:t>10/31/23</a:t>
             </a:fld>
             <a:endParaRPr lang="en-US"/>
           </a:p>
@@ -2259,7 +2259,7 @@
           <a:p>
             <a:fld id="{786A929C-FE04-1346-8C31-1E928BF786A4}" type="datetimeFigureOut">
               <a:rPr lang="en-US" smtClean="0"/>
-              <a:t>10/30/23</a:t>
+              <a:t>10/31/23</a:t>
             </a:fld>
             <a:endParaRPr lang="en-US"/>
           </a:p>
@@ -2400,7 +2400,7 @@
           <a:p>
             <a:fld id="{786A929C-FE04-1346-8C31-1E928BF786A4}" type="datetimeFigureOut">
               <a:rPr lang="en-US" smtClean="0"/>
-              <a:t>10/30/23</a:t>
+              <a:t>10/31/23</a:t>
             </a:fld>
             <a:endParaRPr lang="en-US"/>
           </a:p>
@@ -2513,7 +2513,7 @@
           <a:p>
             <a:fld id="{786A929C-FE04-1346-8C31-1E928BF786A4}" type="datetimeFigureOut">
               <a:rPr lang="en-US" smtClean="0"/>
-              <a:t>10/30/23</a:t>
+              <a:t>10/31/23</a:t>
             </a:fld>
             <a:endParaRPr lang="en-US"/>
           </a:p>
@@ -2824,7 +2824,7 @@
           <a:p>
             <a:fld id="{786A929C-FE04-1346-8C31-1E928BF786A4}" type="datetimeFigureOut">
               <a:rPr lang="en-US" smtClean="0"/>
-              <a:t>10/30/23</a:t>
+              <a:t>10/31/23</a:t>
             </a:fld>
             <a:endParaRPr lang="en-US"/>
           </a:p>
@@ -3112,7 +3112,7 @@
           <a:p>
             <a:fld id="{786A929C-FE04-1346-8C31-1E928BF786A4}" type="datetimeFigureOut">
               <a:rPr lang="en-US" smtClean="0"/>
-              <a:t>10/30/23</a:t>
+              <a:t>10/31/23</a:t>
             </a:fld>
             <a:endParaRPr lang="en-US"/>
           </a:p>
@@ -3353,7 +3353,7 @@
           <a:p>
             <a:fld id="{786A929C-FE04-1346-8C31-1E928BF786A4}" type="datetimeFigureOut">
               <a:rPr lang="en-US" smtClean="0"/>
-              <a:t>10/30/23</a:t>
+              <a:t>10/31/23</a:t>
             </a:fld>
             <a:endParaRPr lang="en-US"/>
           </a:p>
@@ -4749,8 +4749,8 @@
         </p:nvSpPr>
         <p:spPr>
           <a:xfrm>
-            <a:off x="5178181" y="5108486"/>
-            <a:ext cx="488693" cy="221503"/>
+            <a:off x="3871707" y="5558528"/>
+            <a:ext cx="404959" cy="223206"/>
           </a:xfrm>
           <a:prstGeom prst="rect">
             <a:avLst/>
@@ -4908,8 +4908,8 @@
         </p:nvSpPr>
         <p:spPr>
           <a:xfrm>
-            <a:off x="3865478" y="5585059"/>
-            <a:ext cx="397043" cy="168441"/>
+            <a:off x="5131132" y="5108486"/>
+            <a:ext cx="533668" cy="230247"/>
           </a:xfrm>
           <a:prstGeom prst="rect">
             <a:avLst/>
@@ -5701,10 +5701,10 @@
       </p:sp>
       <p:sp>
         <p:nvSpPr>
-          <p:cNvPr id="11" name="Rectangle 10">
-            <a:extLst>
-              <a:ext uri="{FF2B5EF4-FFF2-40B4-BE49-F238E27FC236}">
-                <a16:creationId xmlns:a16="http://schemas.microsoft.com/office/drawing/2014/main" id="{5ADAB086-05CC-88D1-70CF-973E3CC1962A}"/>
+          <p:cNvPr id="12" name="Rectangle 11">
+            <a:extLst>
+              <a:ext uri="{FF2B5EF4-FFF2-40B4-BE49-F238E27FC236}">
+                <a16:creationId xmlns:a16="http://schemas.microsoft.com/office/drawing/2014/main" id="{67881B7A-04B8-7F01-78E2-B1EC517BCD1B}"/>
               </a:ext>
             </a:extLst>
           </p:cNvPr>
@@ -5713,8 +5713,8 @@
         </p:nvSpPr>
         <p:spPr>
           <a:xfrm>
-            <a:off x="5178181" y="5108486"/>
-            <a:ext cx="488693" cy="221503"/>
+            <a:off x="7522945" y="3259221"/>
+            <a:ext cx="3616959" cy="648523"/>
           </a:xfrm>
           <a:prstGeom prst="rect">
             <a:avLst/>
@@ -5745,6 +5745,63 @@
           <a:bodyPr rtlCol="0" anchor="ctr"/>
           <a:lstStyle/>
           <a:p>
+            <a:r>
+              <a:rPr lang="en-US" sz="2800" dirty="0">
+                <a:solidFill>
+                  <a:schemeClr val="tx1"/>
+                </a:solidFill>
+              </a:rPr>
+              <a:t>C2</a:t>
+            </a:r>
+          </a:p>
+        </p:txBody>
+      </p:sp>
+      <p:sp>
+        <p:nvSpPr>
+          <p:cNvPr id="13" name="Rectangle 12">
+            <a:extLst>
+              <a:ext uri="{FF2B5EF4-FFF2-40B4-BE49-F238E27FC236}">
+                <a16:creationId xmlns:a16="http://schemas.microsoft.com/office/drawing/2014/main" id="{C2665C80-F6B8-70F3-D849-994E04226ADB}"/>
+              </a:ext>
+            </a:extLst>
+          </p:cNvPr>
+          <p:cNvSpPr/>
+          <p:nvPr/>
+        </p:nvSpPr>
+        <p:spPr>
+          <a:xfrm>
+            <a:off x="2511221" y="2284182"/>
+            <a:ext cx="1014032" cy="291142"/>
+          </a:xfrm>
+          <a:prstGeom prst="rect">
+            <a:avLst/>
+          </a:prstGeom>
+          <a:solidFill>
+            <a:srgbClr val="00B050">
+              <a:alpha val="35000"/>
+            </a:srgbClr>
+          </a:solidFill>
+        </p:spPr>
+        <p:style>
+          <a:lnRef idx="2">
+            <a:schemeClr val="accent1">
+              <a:shade val="50000"/>
+            </a:schemeClr>
+          </a:lnRef>
+          <a:fillRef idx="1">
+            <a:schemeClr val="accent1"/>
+          </a:fillRef>
+          <a:effectRef idx="0">
+            <a:schemeClr val="accent1"/>
+          </a:effectRef>
+          <a:fontRef idx="minor">
+            <a:schemeClr val="lt1"/>
+          </a:fontRef>
+        </p:style>
+        <p:txBody>
+          <a:bodyPr rtlCol="0" anchor="ctr"/>
+          <a:lstStyle/>
+          <a:p>
             <a:pPr algn="ctr"/>
             <a:endParaRPr lang="en-US"/>
           </a:p>
@@ -5752,10 +5809,10 @@
       </p:sp>
       <p:sp>
         <p:nvSpPr>
-          <p:cNvPr id="12" name="Rectangle 11">
-            <a:extLst>
-              <a:ext uri="{FF2B5EF4-FFF2-40B4-BE49-F238E27FC236}">
-                <a16:creationId xmlns:a16="http://schemas.microsoft.com/office/drawing/2014/main" id="{67881B7A-04B8-7F01-78E2-B1EC517BCD1B}"/>
+          <p:cNvPr id="15" name="Rectangle 14">
+            <a:extLst>
+              <a:ext uri="{FF2B5EF4-FFF2-40B4-BE49-F238E27FC236}">
+                <a16:creationId xmlns:a16="http://schemas.microsoft.com/office/drawing/2014/main" id="{108F3C2C-A3F9-D696-5C99-22D4D90FCCDD}"/>
               </a:ext>
             </a:extLst>
           </p:cNvPr>
@@ -5764,8 +5821,65 @@
         </p:nvSpPr>
         <p:spPr>
           <a:xfrm>
-            <a:off x="7522945" y="3259221"/>
+            <a:off x="7522945" y="4307338"/>
             <a:ext cx="3616959" cy="648523"/>
+          </a:xfrm>
+          <a:prstGeom prst="rect">
+            <a:avLst/>
+          </a:prstGeom>
+          <a:solidFill>
+            <a:srgbClr val="00B050">
+              <a:alpha val="35000"/>
+            </a:srgbClr>
+          </a:solidFill>
+        </p:spPr>
+        <p:style>
+          <a:lnRef idx="2">
+            <a:schemeClr val="accent1">
+              <a:shade val="50000"/>
+            </a:schemeClr>
+          </a:lnRef>
+          <a:fillRef idx="1">
+            <a:schemeClr val="accent1"/>
+          </a:fillRef>
+          <a:effectRef idx="0">
+            <a:schemeClr val="accent1"/>
+          </a:effectRef>
+          <a:fontRef idx="minor">
+            <a:schemeClr val="lt1"/>
+          </a:fontRef>
+        </p:style>
+        <p:txBody>
+          <a:bodyPr rtlCol="0" anchor="ctr"/>
+          <a:lstStyle/>
+          <a:p>
+            <a:r>
+              <a:rPr lang="en-US" sz="2800" dirty="0">
+                <a:solidFill>
+                  <a:schemeClr val="tx1"/>
+                </a:solidFill>
+              </a:rPr>
+              <a:t>B1</a:t>
+            </a:r>
+          </a:p>
+        </p:txBody>
+      </p:sp>
+      <p:sp>
+        <p:nvSpPr>
+          <p:cNvPr id="16" name="Rectangle 15">
+            <a:extLst>
+              <a:ext uri="{FF2B5EF4-FFF2-40B4-BE49-F238E27FC236}">
+                <a16:creationId xmlns:a16="http://schemas.microsoft.com/office/drawing/2014/main" id="{788FDE96-A71D-B9D8-62AC-86CF2C591138}"/>
+              </a:ext>
+            </a:extLst>
+          </p:cNvPr>
+          <p:cNvSpPr/>
+          <p:nvPr/>
+        </p:nvSpPr>
+        <p:spPr>
+          <a:xfrm>
+            <a:off x="3871707" y="5558528"/>
+            <a:ext cx="404959" cy="223206"/>
           </a:xfrm>
           <a:prstGeom prst="rect">
             <a:avLst/>
@@ -5796,23 +5910,17 @@
           <a:bodyPr rtlCol="0" anchor="ctr"/>
           <a:lstStyle/>
           <a:p>
-            <a:r>
-              <a:rPr lang="en-US" sz="2800" dirty="0">
-                <a:solidFill>
-                  <a:schemeClr val="tx1"/>
-                </a:solidFill>
-              </a:rPr>
-              <a:t>C2</a:t>
-            </a:r>
-          </a:p>
-        </p:txBody>
-      </p:sp>
-      <p:sp>
-        <p:nvSpPr>
-          <p:cNvPr id="13" name="Rectangle 12">
-            <a:extLst>
-              <a:ext uri="{FF2B5EF4-FFF2-40B4-BE49-F238E27FC236}">
-                <a16:creationId xmlns:a16="http://schemas.microsoft.com/office/drawing/2014/main" id="{C2665C80-F6B8-70F3-D849-994E04226ADB}"/>
+            <a:pPr algn="ctr"/>
+            <a:endParaRPr lang="en-US"/>
+          </a:p>
+        </p:txBody>
+      </p:sp>
+      <p:sp>
+        <p:nvSpPr>
+          <p:cNvPr id="17" name="Rectangle 16">
+            <a:extLst>
+              <a:ext uri="{FF2B5EF4-FFF2-40B4-BE49-F238E27FC236}">
+                <a16:creationId xmlns:a16="http://schemas.microsoft.com/office/drawing/2014/main" id="{FF5CA095-5735-D0AD-3E94-F1C4B0190496}"/>
               </a:ext>
             </a:extLst>
           </p:cNvPr>
@@ -5821,8 +5929,8 @@
         </p:nvSpPr>
         <p:spPr>
           <a:xfrm>
-            <a:off x="2511221" y="2284182"/>
-            <a:ext cx="1014032" cy="291142"/>
+            <a:off x="5131132" y="5108486"/>
+            <a:ext cx="533668" cy="230247"/>
           </a:xfrm>
           <a:prstGeom prst="rect">
             <a:avLst/>
@@ -5855,114 +5963,6 @@
           <a:p>
             <a:pPr algn="ctr"/>
             <a:endParaRPr lang="en-US"/>
-          </a:p>
-        </p:txBody>
-      </p:sp>
-      <p:sp>
-        <p:nvSpPr>
-          <p:cNvPr id="14" name="Rectangle 13">
-            <a:extLst>
-              <a:ext uri="{FF2B5EF4-FFF2-40B4-BE49-F238E27FC236}">
-                <a16:creationId xmlns:a16="http://schemas.microsoft.com/office/drawing/2014/main" id="{7E8EC379-21A9-0C81-C682-ADA41B6549AD}"/>
-              </a:ext>
-            </a:extLst>
-          </p:cNvPr>
-          <p:cNvSpPr/>
-          <p:nvPr/>
-        </p:nvSpPr>
-        <p:spPr>
-          <a:xfrm>
-            <a:off x="3865478" y="5585059"/>
-            <a:ext cx="397043" cy="168441"/>
-          </a:xfrm>
-          <a:prstGeom prst="rect">
-            <a:avLst/>
-          </a:prstGeom>
-          <a:solidFill>
-            <a:srgbClr val="00B050">
-              <a:alpha val="35000"/>
-            </a:srgbClr>
-          </a:solidFill>
-        </p:spPr>
-        <p:style>
-          <a:lnRef idx="2">
-            <a:schemeClr val="accent1">
-              <a:shade val="50000"/>
-            </a:schemeClr>
-          </a:lnRef>
-          <a:fillRef idx="1">
-            <a:schemeClr val="accent1"/>
-          </a:fillRef>
-          <a:effectRef idx="0">
-            <a:schemeClr val="accent1"/>
-          </a:effectRef>
-          <a:fontRef idx="minor">
-            <a:schemeClr val="lt1"/>
-          </a:fontRef>
-        </p:style>
-        <p:txBody>
-          <a:bodyPr rtlCol="0" anchor="ctr"/>
-          <a:lstStyle/>
-          <a:p>
-            <a:pPr algn="ctr"/>
-            <a:endParaRPr lang="en-US"/>
-          </a:p>
-        </p:txBody>
-      </p:sp>
-      <p:sp>
-        <p:nvSpPr>
-          <p:cNvPr id="15" name="Rectangle 14">
-            <a:extLst>
-              <a:ext uri="{FF2B5EF4-FFF2-40B4-BE49-F238E27FC236}">
-                <a16:creationId xmlns:a16="http://schemas.microsoft.com/office/drawing/2014/main" id="{108F3C2C-A3F9-D696-5C99-22D4D90FCCDD}"/>
-              </a:ext>
-            </a:extLst>
-          </p:cNvPr>
-          <p:cNvSpPr/>
-          <p:nvPr/>
-        </p:nvSpPr>
-        <p:spPr>
-          <a:xfrm>
-            <a:off x="7522945" y="4307338"/>
-            <a:ext cx="3616959" cy="648523"/>
-          </a:xfrm>
-          <a:prstGeom prst="rect">
-            <a:avLst/>
-          </a:prstGeom>
-          <a:solidFill>
-            <a:srgbClr val="00B050">
-              <a:alpha val="35000"/>
-            </a:srgbClr>
-          </a:solidFill>
-        </p:spPr>
-        <p:style>
-          <a:lnRef idx="2">
-            <a:schemeClr val="accent1">
-              <a:shade val="50000"/>
-            </a:schemeClr>
-          </a:lnRef>
-          <a:fillRef idx="1">
-            <a:schemeClr val="accent1"/>
-          </a:fillRef>
-          <a:effectRef idx="0">
-            <a:schemeClr val="accent1"/>
-          </a:effectRef>
-          <a:fontRef idx="minor">
-            <a:schemeClr val="lt1"/>
-          </a:fontRef>
-        </p:style>
-        <p:txBody>
-          <a:bodyPr rtlCol="0" anchor="ctr"/>
-          <a:lstStyle/>
-          <a:p>
-            <a:r>
-              <a:rPr lang="en-US" sz="2800" dirty="0">
-                <a:solidFill>
-                  <a:schemeClr val="tx1"/>
-                </a:solidFill>
-              </a:rPr>
-              <a:t>B1</a:t>
-            </a:r>
           </a:p>
         </p:txBody>
       </p:sp>
@@ -6665,10 +6665,10 @@
       </p:sp>
       <p:sp>
         <p:nvSpPr>
-          <p:cNvPr id="11" name="Rectangle 10">
-            <a:extLst>
-              <a:ext uri="{FF2B5EF4-FFF2-40B4-BE49-F238E27FC236}">
-                <a16:creationId xmlns:a16="http://schemas.microsoft.com/office/drawing/2014/main" id="{5ADAB086-05CC-88D1-70CF-973E3CC1962A}"/>
+          <p:cNvPr id="12" name="Rectangle 11">
+            <a:extLst>
+              <a:ext uri="{FF2B5EF4-FFF2-40B4-BE49-F238E27FC236}">
+                <a16:creationId xmlns:a16="http://schemas.microsoft.com/office/drawing/2014/main" id="{67881B7A-04B8-7F01-78E2-B1EC517BCD1B}"/>
               </a:ext>
             </a:extLst>
           </p:cNvPr>
@@ -6677,8 +6677,8 @@
         </p:nvSpPr>
         <p:spPr>
           <a:xfrm>
-            <a:off x="5178181" y="5108486"/>
-            <a:ext cx="488693" cy="221503"/>
+            <a:off x="7522945" y="3259221"/>
+            <a:ext cx="3616959" cy="648523"/>
           </a:xfrm>
           <a:prstGeom prst="rect">
             <a:avLst/>
@@ -6709,6 +6709,63 @@
           <a:bodyPr rtlCol="0" anchor="ctr"/>
           <a:lstStyle/>
           <a:p>
+            <a:r>
+              <a:rPr lang="en-US" sz="2800" dirty="0">
+                <a:solidFill>
+                  <a:schemeClr val="tx1"/>
+                </a:solidFill>
+              </a:rPr>
+              <a:t>C2</a:t>
+            </a:r>
+          </a:p>
+        </p:txBody>
+      </p:sp>
+      <p:sp>
+        <p:nvSpPr>
+          <p:cNvPr id="13" name="Rectangle 12">
+            <a:extLst>
+              <a:ext uri="{FF2B5EF4-FFF2-40B4-BE49-F238E27FC236}">
+                <a16:creationId xmlns:a16="http://schemas.microsoft.com/office/drawing/2014/main" id="{C2665C80-F6B8-70F3-D849-994E04226ADB}"/>
+              </a:ext>
+            </a:extLst>
+          </p:cNvPr>
+          <p:cNvSpPr/>
+          <p:nvPr/>
+        </p:nvSpPr>
+        <p:spPr>
+          <a:xfrm>
+            <a:off x="2511221" y="2284182"/>
+            <a:ext cx="1014032" cy="291142"/>
+          </a:xfrm>
+          <a:prstGeom prst="rect">
+            <a:avLst/>
+          </a:prstGeom>
+          <a:solidFill>
+            <a:srgbClr val="00B050">
+              <a:alpha val="35000"/>
+            </a:srgbClr>
+          </a:solidFill>
+        </p:spPr>
+        <p:style>
+          <a:lnRef idx="2">
+            <a:schemeClr val="accent1">
+              <a:shade val="50000"/>
+            </a:schemeClr>
+          </a:lnRef>
+          <a:fillRef idx="1">
+            <a:schemeClr val="accent1"/>
+          </a:fillRef>
+          <a:effectRef idx="0">
+            <a:schemeClr val="accent1"/>
+          </a:effectRef>
+          <a:fontRef idx="minor">
+            <a:schemeClr val="lt1"/>
+          </a:fontRef>
+        </p:style>
+        <p:txBody>
+          <a:bodyPr rtlCol="0" anchor="ctr"/>
+          <a:lstStyle/>
+          <a:p>
             <a:pPr algn="ctr"/>
             <a:endParaRPr lang="en-US"/>
           </a:p>
@@ -6716,10 +6773,10 @@
       </p:sp>
       <p:sp>
         <p:nvSpPr>
-          <p:cNvPr id="12" name="Rectangle 11">
-            <a:extLst>
-              <a:ext uri="{FF2B5EF4-FFF2-40B4-BE49-F238E27FC236}">
-                <a16:creationId xmlns:a16="http://schemas.microsoft.com/office/drawing/2014/main" id="{67881B7A-04B8-7F01-78E2-B1EC517BCD1B}"/>
+          <p:cNvPr id="15" name="Rectangle 14">
+            <a:extLst>
+              <a:ext uri="{FF2B5EF4-FFF2-40B4-BE49-F238E27FC236}">
+                <a16:creationId xmlns:a16="http://schemas.microsoft.com/office/drawing/2014/main" id="{108F3C2C-A3F9-D696-5C99-22D4D90FCCDD}"/>
               </a:ext>
             </a:extLst>
           </p:cNvPr>
@@ -6728,8 +6785,65 @@
         </p:nvSpPr>
         <p:spPr>
           <a:xfrm>
-            <a:off x="7522945" y="3259221"/>
+            <a:off x="7522945" y="4307338"/>
             <a:ext cx="3616959" cy="648523"/>
+          </a:xfrm>
+          <a:prstGeom prst="rect">
+            <a:avLst/>
+          </a:prstGeom>
+          <a:solidFill>
+            <a:srgbClr val="00B050">
+              <a:alpha val="35000"/>
+            </a:srgbClr>
+          </a:solidFill>
+        </p:spPr>
+        <p:style>
+          <a:lnRef idx="2">
+            <a:schemeClr val="accent1">
+              <a:shade val="50000"/>
+            </a:schemeClr>
+          </a:lnRef>
+          <a:fillRef idx="1">
+            <a:schemeClr val="accent1"/>
+          </a:fillRef>
+          <a:effectRef idx="0">
+            <a:schemeClr val="accent1"/>
+          </a:effectRef>
+          <a:fontRef idx="minor">
+            <a:schemeClr val="lt1"/>
+          </a:fontRef>
+        </p:style>
+        <p:txBody>
+          <a:bodyPr rtlCol="0" anchor="ctr"/>
+          <a:lstStyle/>
+          <a:p>
+            <a:r>
+              <a:rPr lang="en-US" sz="2800" dirty="0">
+                <a:solidFill>
+                  <a:schemeClr val="tx1"/>
+                </a:solidFill>
+              </a:rPr>
+              <a:t>B1</a:t>
+            </a:r>
+          </a:p>
+        </p:txBody>
+      </p:sp>
+      <p:sp>
+        <p:nvSpPr>
+          <p:cNvPr id="16" name="Rectangle 15">
+            <a:extLst>
+              <a:ext uri="{FF2B5EF4-FFF2-40B4-BE49-F238E27FC236}">
+                <a16:creationId xmlns:a16="http://schemas.microsoft.com/office/drawing/2014/main" id="{DC3289A9-7184-8B5C-E588-4BF1E563DE4E}"/>
+              </a:ext>
+            </a:extLst>
+          </p:cNvPr>
+          <p:cNvSpPr/>
+          <p:nvPr/>
+        </p:nvSpPr>
+        <p:spPr>
+          <a:xfrm>
+            <a:off x="3871707" y="5558528"/>
+            <a:ext cx="404959" cy="223206"/>
           </a:xfrm>
           <a:prstGeom prst="rect">
             <a:avLst/>
@@ -6760,23 +6874,17 @@
           <a:bodyPr rtlCol="0" anchor="ctr"/>
           <a:lstStyle/>
           <a:p>
-            <a:r>
-              <a:rPr lang="en-US" sz="2800" dirty="0">
-                <a:solidFill>
-                  <a:schemeClr val="tx1"/>
-                </a:solidFill>
-              </a:rPr>
-              <a:t>C2</a:t>
-            </a:r>
-          </a:p>
-        </p:txBody>
-      </p:sp>
-      <p:sp>
-        <p:nvSpPr>
-          <p:cNvPr id="13" name="Rectangle 12">
-            <a:extLst>
-              <a:ext uri="{FF2B5EF4-FFF2-40B4-BE49-F238E27FC236}">
-                <a16:creationId xmlns:a16="http://schemas.microsoft.com/office/drawing/2014/main" id="{C2665C80-F6B8-70F3-D849-994E04226ADB}"/>
+            <a:pPr algn="ctr"/>
+            <a:endParaRPr lang="en-US"/>
+          </a:p>
+        </p:txBody>
+      </p:sp>
+      <p:sp>
+        <p:nvSpPr>
+          <p:cNvPr id="17" name="Rectangle 16">
+            <a:extLst>
+              <a:ext uri="{FF2B5EF4-FFF2-40B4-BE49-F238E27FC236}">
+                <a16:creationId xmlns:a16="http://schemas.microsoft.com/office/drawing/2014/main" id="{2B819033-EF0B-5345-FDD4-D94038BAB2FD}"/>
               </a:ext>
             </a:extLst>
           </p:cNvPr>
@@ -6785,8 +6893,8 @@
         </p:nvSpPr>
         <p:spPr>
           <a:xfrm>
-            <a:off x="2511221" y="2284182"/>
-            <a:ext cx="1014032" cy="291142"/>
+            <a:off x="5131132" y="5108486"/>
+            <a:ext cx="533668" cy="230247"/>
           </a:xfrm>
           <a:prstGeom prst="rect">
             <a:avLst/>
@@ -6819,114 +6927,6 @@
           <a:p>
             <a:pPr algn="ctr"/>
             <a:endParaRPr lang="en-US"/>
-          </a:p>
-        </p:txBody>
-      </p:sp>
-      <p:sp>
-        <p:nvSpPr>
-          <p:cNvPr id="14" name="Rectangle 13">
-            <a:extLst>
-              <a:ext uri="{FF2B5EF4-FFF2-40B4-BE49-F238E27FC236}">
-                <a16:creationId xmlns:a16="http://schemas.microsoft.com/office/drawing/2014/main" id="{7E8EC379-21A9-0C81-C682-ADA41B6549AD}"/>
-              </a:ext>
-            </a:extLst>
-          </p:cNvPr>
-          <p:cNvSpPr/>
-          <p:nvPr/>
-        </p:nvSpPr>
-        <p:spPr>
-          <a:xfrm>
-            <a:off x="3865478" y="5585059"/>
-            <a:ext cx="397043" cy="168441"/>
-          </a:xfrm>
-          <a:prstGeom prst="rect">
-            <a:avLst/>
-          </a:prstGeom>
-          <a:solidFill>
-            <a:srgbClr val="00B050">
-              <a:alpha val="35000"/>
-            </a:srgbClr>
-          </a:solidFill>
-        </p:spPr>
-        <p:style>
-          <a:lnRef idx="2">
-            <a:schemeClr val="accent1">
-              <a:shade val="50000"/>
-            </a:schemeClr>
-          </a:lnRef>
-          <a:fillRef idx="1">
-            <a:schemeClr val="accent1"/>
-          </a:fillRef>
-          <a:effectRef idx="0">
-            <a:schemeClr val="accent1"/>
-          </a:effectRef>
-          <a:fontRef idx="minor">
-            <a:schemeClr val="lt1"/>
-          </a:fontRef>
-        </p:style>
-        <p:txBody>
-          <a:bodyPr rtlCol="0" anchor="ctr"/>
-          <a:lstStyle/>
-          <a:p>
-            <a:pPr algn="ctr"/>
-            <a:endParaRPr lang="en-US"/>
-          </a:p>
-        </p:txBody>
-      </p:sp>
-      <p:sp>
-        <p:nvSpPr>
-          <p:cNvPr id="15" name="Rectangle 14">
-            <a:extLst>
-              <a:ext uri="{FF2B5EF4-FFF2-40B4-BE49-F238E27FC236}">
-                <a16:creationId xmlns:a16="http://schemas.microsoft.com/office/drawing/2014/main" id="{108F3C2C-A3F9-D696-5C99-22D4D90FCCDD}"/>
-              </a:ext>
-            </a:extLst>
-          </p:cNvPr>
-          <p:cNvSpPr/>
-          <p:nvPr/>
-        </p:nvSpPr>
-        <p:spPr>
-          <a:xfrm>
-            <a:off x="7522945" y="4307338"/>
-            <a:ext cx="3616959" cy="648523"/>
-          </a:xfrm>
-          <a:prstGeom prst="rect">
-            <a:avLst/>
-          </a:prstGeom>
-          <a:solidFill>
-            <a:srgbClr val="00B050">
-              <a:alpha val="35000"/>
-            </a:srgbClr>
-          </a:solidFill>
-        </p:spPr>
-        <p:style>
-          <a:lnRef idx="2">
-            <a:schemeClr val="accent1">
-              <a:shade val="50000"/>
-            </a:schemeClr>
-          </a:lnRef>
-          <a:fillRef idx="1">
-            <a:schemeClr val="accent1"/>
-          </a:fillRef>
-          <a:effectRef idx="0">
-            <a:schemeClr val="accent1"/>
-          </a:effectRef>
-          <a:fontRef idx="minor">
-            <a:schemeClr val="lt1"/>
-          </a:fontRef>
-        </p:style>
-        <p:txBody>
-          <a:bodyPr rtlCol="0" anchor="ctr"/>
-          <a:lstStyle/>
-          <a:p>
-            <a:r>
-              <a:rPr lang="en-US" sz="2800" dirty="0">
-                <a:solidFill>
-                  <a:schemeClr val="tx1"/>
-                </a:solidFill>
-              </a:rPr>
-              <a:t>B1</a:t>
-            </a:r>
           </a:p>
         </p:txBody>
       </p:sp>
@@ -7629,10 +7629,10 @@
       </p:sp>
       <p:sp>
         <p:nvSpPr>
-          <p:cNvPr id="11" name="Rectangle 10">
-            <a:extLst>
-              <a:ext uri="{FF2B5EF4-FFF2-40B4-BE49-F238E27FC236}">
-                <a16:creationId xmlns:a16="http://schemas.microsoft.com/office/drawing/2014/main" id="{5ADAB086-05CC-88D1-70CF-973E3CC1962A}"/>
+          <p:cNvPr id="12" name="Rectangle 11">
+            <a:extLst>
+              <a:ext uri="{FF2B5EF4-FFF2-40B4-BE49-F238E27FC236}">
+                <a16:creationId xmlns:a16="http://schemas.microsoft.com/office/drawing/2014/main" id="{67881B7A-04B8-7F01-78E2-B1EC517BCD1B}"/>
               </a:ext>
             </a:extLst>
           </p:cNvPr>
@@ -7641,8 +7641,8 @@
         </p:nvSpPr>
         <p:spPr>
           <a:xfrm>
-            <a:off x="5178181" y="5108486"/>
-            <a:ext cx="488693" cy="221503"/>
+            <a:off x="7522945" y="3259221"/>
+            <a:ext cx="3616959" cy="648523"/>
           </a:xfrm>
           <a:prstGeom prst="rect">
             <a:avLst/>
@@ -7673,6 +7673,63 @@
           <a:bodyPr rtlCol="0" anchor="ctr"/>
           <a:lstStyle/>
           <a:p>
+            <a:r>
+              <a:rPr lang="en-US" sz="2800" dirty="0">
+                <a:solidFill>
+                  <a:schemeClr val="tx1"/>
+                </a:solidFill>
+              </a:rPr>
+              <a:t>C2</a:t>
+            </a:r>
+          </a:p>
+        </p:txBody>
+      </p:sp>
+      <p:sp>
+        <p:nvSpPr>
+          <p:cNvPr id="13" name="Rectangle 12">
+            <a:extLst>
+              <a:ext uri="{FF2B5EF4-FFF2-40B4-BE49-F238E27FC236}">
+                <a16:creationId xmlns:a16="http://schemas.microsoft.com/office/drawing/2014/main" id="{C2665C80-F6B8-70F3-D849-994E04226ADB}"/>
+              </a:ext>
+            </a:extLst>
+          </p:cNvPr>
+          <p:cNvSpPr/>
+          <p:nvPr/>
+        </p:nvSpPr>
+        <p:spPr>
+          <a:xfrm>
+            <a:off x="2511221" y="2284182"/>
+            <a:ext cx="1014032" cy="291142"/>
+          </a:xfrm>
+          <a:prstGeom prst="rect">
+            <a:avLst/>
+          </a:prstGeom>
+          <a:solidFill>
+            <a:srgbClr val="00B050">
+              <a:alpha val="35000"/>
+            </a:srgbClr>
+          </a:solidFill>
+        </p:spPr>
+        <p:style>
+          <a:lnRef idx="2">
+            <a:schemeClr val="accent1">
+              <a:shade val="50000"/>
+            </a:schemeClr>
+          </a:lnRef>
+          <a:fillRef idx="1">
+            <a:schemeClr val="accent1"/>
+          </a:fillRef>
+          <a:effectRef idx="0">
+            <a:schemeClr val="accent1"/>
+          </a:effectRef>
+          <a:fontRef idx="minor">
+            <a:schemeClr val="lt1"/>
+          </a:fontRef>
+        </p:style>
+        <p:txBody>
+          <a:bodyPr rtlCol="0" anchor="ctr"/>
+          <a:lstStyle/>
+          <a:p>
             <a:pPr algn="ctr"/>
             <a:endParaRPr lang="en-US"/>
           </a:p>
@@ -7680,10 +7737,10 @@
       </p:sp>
       <p:sp>
         <p:nvSpPr>
-          <p:cNvPr id="12" name="Rectangle 11">
-            <a:extLst>
-              <a:ext uri="{FF2B5EF4-FFF2-40B4-BE49-F238E27FC236}">
-                <a16:creationId xmlns:a16="http://schemas.microsoft.com/office/drawing/2014/main" id="{67881B7A-04B8-7F01-78E2-B1EC517BCD1B}"/>
+          <p:cNvPr id="15" name="Rectangle 14">
+            <a:extLst>
+              <a:ext uri="{FF2B5EF4-FFF2-40B4-BE49-F238E27FC236}">
+                <a16:creationId xmlns:a16="http://schemas.microsoft.com/office/drawing/2014/main" id="{108F3C2C-A3F9-D696-5C99-22D4D90FCCDD}"/>
               </a:ext>
             </a:extLst>
           </p:cNvPr>
@@ -7692,8 +7749,65 @@
         </p:nvSpPr>
         <p:spPr>
           <a:xfrm>
-            <a:off x="7522945" y="3259221"/>
+            <a:off x="7522945" y="4307338"/>
             <a:ext cx="3616959" cy="648523"/>
+          </a:xfrm>
+          <a:prstGeom prst="rect">
+            <a:avLst/>
+          </a:prstGeom>
+          <a:solidFill>
+            <a:srgbClr val="00B050">
+              <a:alpha val="35000"/>
+            </a:srgbClr>
+          </a:solidFill>
+        </p:spPr>
+        <p:style>
+          <a:lnRef idx="2">
+            <a:schemeClr val="accent1">
+              <a:shade val="50000"/>
+            </a:schemeClr>
+          </a:lnRef>
+          <a:fillRef idx="1">
+            <a:schemeClr val="accent1"/>
+          </a:fillRef>
+          <a:effectRef idx="0">
+            <a:schemeClr val="accent1"/>
+          </a:effectRef>
+          <a:fontRef idx="minor">
+            <a:schemeClr val="lt1"/>
+          </a:fontRef>
+        </p:style>
+        <p:txBody>
+          <a:bodyPr rtlCol="0" anchor="ctr"/>
+          <a:lstStyle/>
+          <a:p>
+            <a:r>
+              <a:rPr lang="en-US" sz="2800" dirty="0">
+                <a:solidFill>
+                  <a:schemeClr val="tx1"/>
+                </a:solidFill>
+              </a:rPr>
+              <a:t>B1</a:t>
+            </a:r>
+          </a:p>
+        </p:txBody>
+      </p:sp>
+      <p:sp>
+        <p:nvSpPr>
+          <p:cNvPr id="16" name="Rectangle 15">
+            <a:extLst>
+              <a:ext uri="{FF2B5EF4-FFF2-40B4-BE49-F238E27FC236}">
+                <a16:creationId xmlns:a16="http://schemas.microsoft.com/office/drawing/2014/main" id="{504B1B54-CF7D-C14B-F18F-42EB7074CEEE}"/>
+              </a:ext>
+            </a:extLst>
+          </p:cNvPr>
+          <p:cNvSpPr/>
+          <p:nvPr/>
+        </p:nvSpPr>
+        <p:spPr>
+          <a:xfrm>
+            <a:off x="3871707" y="5558528"/>
+            <a:ext cx="404959" cy="223206"/>
           </a:xfrm>
           <a:prstGeom prst="rect">
             <a:avLst/>
@@ -7724,23 +7838,17 @@
           <a:bodyPr rtlCol="0" anchor="ctr"/>
           <a:lstStyle/>
           <a:p>
-            <a:r>
-              <a:rPr lang="en-US" sz="2800" dirty="0">
-                <a:solidFill>
-                  <a:schemeClr val="tx1"/>
-                </a:solidFill>
-              </a:rPr>
-              <a:t>C2</a:t>
-            </a:r>
-          </a:p>
-        </p:txBody>
-      </p:sp>
-      <p:sp>
-        <p:nvSpPr>
-          <p:cNvPr id="13" name="Rectangle 12">
-            <a:extLst>
-              <a:ext uri="{FF2B5EF4-FFF2-40B4-BE49-F238E27FC236}">
-                <a16:creationId xmlns:a16="http://schemas.microsoft.com/office/drawing/2014/main" id="{C2665C80-F6B8-70F3-D849-994E04226ADB}"/>
+            <a:pPr algn="ctr"/>
+            <a:endParaRPr lang="en-US"/>
+          </a:p>
+        </p:txBody>
+      </p:sp>
+      <p:sp>
+        <p:nvSpPr>
+          <p:cNvPr id="17" name="Rectangle 16">
+            <a:extLst>
+              <a:ext uri="{FF2B5EF4-FFF2-40B4-BE49-F238E27FC236}">
+                <a16:creationId xmlns:a16="http://schemas.microsoft.com/office/drawing/2014/main" id="{30E77DF4-E910-702B-8D7B-194512F5F131}"/>
               </a:ext>
             </a:extLst>
           </p:cNvPr>
@@ -7749,8 +7857,8 @@
         </p:nvSpPr>
         <p:spPr>
           <a:xfrm>
-            <a:off x="2511221" y="2284182"/>
-            <a:ext cx="1014032" cy="291142"/>
+            <a:off x="5131132" y="5108486"/>
+            <a:ext cx="533668" cy="230247"/>
           </a:xfrm>
           <a:prstGeom prst="rect">
             <a:avLst/>
@@ -7783,114 +7891,6 @@
           <a:p>
             <a:pPr algn="ctr"/>
             <a:endParaRPr lang="en-US"/>
-          </a:p>
-        </p:txBody>
-      </p:sp>
-      <p:sp>
-        <p:nvSpPr>
-          <p:cNvPr id="14" name="Rectangle 13">
-            <a:extLst>
-              <a:ext uri="{FF2B5EF4-FFF2-40B4-BE49-F238E27FC236}">
-                <a16:creationId xmlns:a16="http://schemas.microsoft.com/office/drawing/2014/main" id="{7E8EC379-21A9-0C81-C682-ADA41B6549AD}"/>
-              </a:ext>
-            </a:extLst>
-          </p:cNvPr>
-          <p:cNvSpPr/>
-          <p:nvPr/>
-        </p:nvSpPr>
-        <p:spPr>
-          <a:xfrm>
-            <a:off x="3865478" y="5585059"/>
-            <a:ext cx="397043" cy="168441"/>
-          </a:xfrm>
-          <a:prstGeom prst="rect">
-            <a:avLst/>
-          </a:prstGeom>
-          <a:solidFill>
-            <a:srgbClr val="00B050">
-              <a:alpha val="35000"/>
-            </a:srgbClr>
-          </a:solidFill>
-        </p:spPr>
-        <p:style>
-          <a:lnRef idx="2">
-            <a:schemeClr val="accent1">
-              <a:shade val="50000"/>
-            </a:schemeClr>
-          </a:lnRef>
-          <a:fillRef idx="1">
-            <a:schemeClr val="accent1"/>
-          </a:fillRef>
-          <a:effectRef idx="0">
-            <a:schemeClr val="accent1"/>
-          </a:effectRef>
-          <a:fontRef idx="minor">
-            <a:schemeClr val="lt1"/>
-          </a:fontRef>
-        </p:style>
-        <p:txBody>
-          <a:bodyPr rtlCol="0" anchor="ctr"/>
-          <a:lstStyle/>
-          <a:p>
-            <a:pPr algn="ctr"/>
-            <a:endParaRPr lang="en-US"/>
-          </a:p>
-        </p:txBody>
-      </p:sp>
-      <p:sp>
-        <p:nvSpPr>
-          <p:cNvPr id="15" name="Rectangle 14">
-            <a:extLst>
-              <a:ext uri="{FF2B5EF4-FFF2-40B4-BE49-F238E27FC236}">
-                <a16:creationId xmlns:a16="http://schemas.microsoft.com/office/drawing/2014/main" id="{108F3C2C-A3F9-D696-5C99-22D4D90FCCDD}"/>
-              </a:ext>
-            </a:extLst>
-          </p:cNvPr>
-          <p:cNvSpPr/>
-          <p:nvPr/>
-        </p:nvSpPr>
-        <p:spPr>
-          <a:xfrm>
-            <a:off x="7522945" y="4307338"/>
-            <a:ext cx="3616959" cy="648523"/>
-          </a:xfrm>
-          <a:prstGeom prst="rect">
-            <a:avLst/>
-          </a:prstGeom>
-          <a:solidFill>
-            <a:srgbClr val="00B050">
-              <a:alpha val="35000"/>
-            </a:srgbClr>
-          </a:solidFill>
-        </p:spPr>
-        <p:style>
-          <a:lnRef idx="2">
-            <a:schemeClr val="accent1">
-              <a:shade val="50000"/>
-            </a:schemeClr>
-          </a:lnRef>
-          <a:fillRef idx="1">
-            <a:schemeClr val="accent1"/>
-          </a:fillRef>
-          <a:effectRef idx="0">
-            <a:schemeClr val="accent1"/>
-          </a:effectRef>
-          <a:fontRef idx="minor">
-            <a:schemeClr val="lt1"/>
-          </a:fontRef>
-        </p:style>
-        <p:txBody>
-          <a:bodyPr rtlCol="0" anchor="ctr"/>
-          <a:lstStyle/>
-          <a:p>
-            <a:r>
-              <a:rPr lang="en-US" sz="2800" dirty="0">
-                <a:solidFill>
-                  <a:schemeClr val="tx1"/>
-                </a:solidFill>
-              </a:rPr>
-              <a:t>B1</a:t>
-            </a:r>
           </a:p>
         </p:txBody>
       </p:sp>

</xml_diff>